<commit_message>
Syntax highlighted code for persistent collections.
</commit_message>
<xml_diff>
--- a/Top Things to Learn From Clojure.pptx
+++ b/Top Things to Learn From Clojure.pptx
@@ -998,32 +998,16 @@
           <a:p>
             <a:r>
               <a:rPr lang="en-US" baseline="0" dirty="0" smtClean="0"/>
-              <a:t>Witness the explosion of Perl, Linux </a:t>
-            </a:r>
+              <a:t>Witness the explosion of Perl, Linux – is due to running only in a controlled environment, not everywhere</a:t>
+            </a:r>
+          </a:p>
+          <a:p>
+            <a:endParaRPr lang="en-US" baseline="0" dirty="0" smtClean="0"/>
+          </a:p>
+          <a:p>
             <a:r>
               <a:rPr lang="en-US" baseline="0" dirty="0" smtClean="0"/>
-              <a:t>– </a:t>
-            </a:r>
-            <a:r>
-              <a:rPr lang="en-US" baseline="0" dirty="0" smtClean="0"/>
-              <a:t>is due to running only in a controlled environment, not everywhere</a:t>
-            </a:r>
-          </a:p>
-          <a:p>
-            <a:endParaRPr lang="en-US" baseline="0" dirty="0" smtClean="0"/>
-          </a:p>
-          <a:p>
-            <a:r>
-              <a:rPr lang="en-US" baseline="0" dirty="0" smtClean="0"/>
-              <a:t>Reducing the </a:t>
-            </a:r>
-            <a:r>
-              <a:rPr lang="en-US" baseline="0" dirty="0" smtClean="0"/>
-              <a:t>complexity </a:t>
-            </a:r>
-            <a:r>
-              <a:rPr lang="en-US" baseline="0" dirty="0" smtClean="0"/>
-              <a:t>verbosity of C# </a:t>
+              <a:t>Reducing the complexity verbosity of C# </a:t>
             </a:r>
           </a:p>
           <a:p>
@@ -1753,11 +1737,7 @@
           <a:p>
             <a:r>
               <a:rPr lang="en-US" baseline="0" dirty="0" smtClean="0"/>
-              <a:t>For agents, this </a:t>
-            </a:r>
-            <a:r>
-              <a:rPr lang="en-US" baseline="0" dirty="0" smtClean="0"/>
-              <a:t>includes messages sent (“legalized side-effects”)</a:t>
+              <a:t>For agents, this includes messages sent (“legalized side-effects”)</a:t>
             </a:r>
           </a:p>
           <a:p>
@@ -4248,11 +4228,7 @@
           <a:p>
             <a:r>
               <a:rPr lang="en-US" baseline="0" dirty="0" smtClean="0"/>
-              <a:t>Why not make it the default</a:t>
-            </a:r>
-            <a:r>
-              <a:rPr lang="en-US" baseline="0" dirty="0" smtClean="0"/>
-              <a:t>?</a:t>
+              <a:t>Why not make it the default?</a:t>
             </a:r>
           </a:p>
           <a:p>
@@ -7509,27 +7485,7 @@
                 <a:latin typeface="Neo Sans Std" pitchFamily="34" charset="0"/>
                 <a:ea typeface="Neo Sans Std"/>
               </a:rPr>
-              <a:t>NDC 2011, Oslo, </a:t>
-            </a:r>
-            <a:r>
-              <a:rPr lang="da-DK" dirty="0" smtClean="0">
-                <a:solidFill>
-                  <a:srgbClr val="6D6F71"/>
-                </a:solidFill>
-                <a:latin typeface="Neo Sans Std" pitchFamily="34" charset="0"/>
-                <a:ea typeface="Neo Sans Std"/>
-              </a:rPr>
-              <a:t>June 10th,, </a:t>
-            </a:r>
-            <a:r>
-              <a:rPr lang="da-DK" dirty="0" smtClean="0">
-                <a:solidFill>
-                  <a:srgbClr val="6D6F71"/>
-                </a:solidFill>
-                <a:latin typeface="Neo Sans Std" pitchFamily="34" charset="0"/>
-                <a:ea typeface="Neo Sans Std"/>
-              </a:rPr>
-              <a:t>2011</a:t>
+              <a:t>NDC 2011, Oslo, June 10th,, 2011</a:t>
             </a:r>
             <a:endParaRPr lang="da-DK" sz="2800" dirty="0">
               <a:solidFill>
@@ -9004,7 +8960,7 @@
         </p:nvSpPr>
         <p:spPr bwMode="auto">
           <a:xfrm>
-            <a:off x="4644008" y="2132856"/>
+            <a:off x="4644008" y="2355065"/>
             <a:ext cx="3816424" cy="648072"/>
           </a:xfrm>
           <a:prstGeom prst="rect">
@@ -9070,7 +9026,7 @@
         </p:nvSpPr>
         <p:spPr bwMode="auto">
           <a:xfrm>
-            <a:off x="5559069" y="1910647"/>
+            <a:off x="5559069" y="2132856"/>
             <a:ext cx="3013427" cy="1433273"/>
           </a:xfrm>
           <a:custGeom>
@@ -9418,7 +9374,7 @@
         </p:nvSpPr>
         <p:spPr bwMode="auto">
           <a:xfrm>
-            <a:off x="5343128" y="2204864"/>
+            <a:off x="5343128" y="2427073"/>
             <a:ext cx="381000" cy="504056"/>
           </a:xfrm>
           <a:prstGeom prst="rect">
@@ -9487,7 +9443,7 @@
         </p:nvSpPr>
         <p:spPr bwMode="auto">
           <a:xfrm>
-            <a:off x="6516216" y="2204864"/>
+            <a:off x="6516216" y="2427073"/>
             <a:ext cx="381000" cy="504056"/>
           </a:xfrm>
           <a:prstGeom prst="rect">
@@ -9559,7 +9515,7 @@
         </p:nvSpPr>
         <p:spPr bwMode="auto">
           <a:xfrm>
-            <a:off x="7719392" y="2204864"/>
+            <a:off x="7719392" y="2427073"/>
             <a:ext cx="381000" cy="504056"/>
           </a:xfrm>
           <a:prstGeom prst="rect">
@@ -9634,7 +9590,7 @@
         </p:nvCxnSpPr>
         <p:spPr bwMode="auto">
           <a:xfrm>
-            <a:off x="5724128" y="2456892"/>
+            <a:off x="5724128" y="2679101"/>
             <a:ext cx="792088" cy="0"/>
           </a:xfrm>
           <a:prstGeom prst="straightConnector1">
@@ -9666,7 +9622,7 @@
         </p:nvCxnSpPr>
         <p:spPr bwMode="auto">
           <a:xfrm>
-            <a:off x="6897216" y="2456892"/>
+            <a:off x="6897216" y="2679101"/>
             <a:ext cx="822176" cy="0"/>
           </a:xfrm>
           <a:prstGeom prst="straightConnector1">
@@ -9695,7 +9651,7 @@
         </p:nvSpPr>
         <p:spPr bwMode="auto">
           <a:xfrm>
-            <a:off x="4237484" y="2204864"/>
+            <a:off x="4237484" y="2427073"/>
             <a:ext cx="504056" cy="504056"/>
           </a:xfrm>
           <a:prstGeom prst="ellipse">
@@ -9755,7 +9711,7 @@
         </p:nvCxnSpPr>
         <p:spPr bwMode="auto">
           <a:xfrm>
-            <a:off x="4741540" y="2456892"/>
+            <a:off x="4741540" y="2679101"/>
             <a:ext cx="601588" cy="0"/>
           </a:xfrm>
           <a:prstGeom prst="straightConnector1">
@@ -9786,8 +9742,8 @@
         </p:nvSpPr>
         <p:spPr bwMode="auto">
           <a:xfrm>
-            <a:off x="539552" y="2204864"/>
-            <a:ext cx="3168352" cy="2160240"/>
+            <a:off x="539552" y="2276872"/>
+            <a:ext cx="4104456" cy="2736304"/>
           </a:xfrm>
           <a:prstGeom prst="rect">
             <a:avLst/>
@@ -9993,107 +9949,460 @@
               <a:buNone/>
             </a:pPr>
             <a:r>
-              <a:rPr lang="da-DK" sz="1600" dirty="0" smtClean="0"/>
+              <a:rPr lang="en-US" sz="1600" b="1" dirty="0" smtClean="0">
+                <a:solidFill>
+                  <a:srgbClr val="5E1445"/>
+                </a:solidFill>
+                <a:latin typeface="Consolas-Bold"/>
+              </a:rPr>
               <a:t>(</a:t>
             </a:r>
             <a:r>
-              <a:rPr lang="da-DK" sz="1600" dirty="0" err="1" smtClean="0"/>
+              <a:rPr lang="en-US" sz="1600" dirty="0" err="1">
+                <a:solidFill>
+                  <a:srgbClr val="515151"/>
+                </a:solidFill>
+                <a:latin typeface="Consolas"/>
+              </a:rPr>
               <a:t>def</a:t>
             </a:r>
             <a:r>
-              <a:rPr lang="da-DK" sz="1600" dirty="0" smtClean="0"/>
-              <a:t> a (list 1 2 3))</a:t>
-            </a:r>
-          </a:p>
-          <a:p>
-            <a:pPr>
-              <a:buFont typeface="Symbol" charset="0"/>
-              <a:buChar char=""/>
-            </a:pPr>
-            <a:r>
-              <a:rPr lang="da-DK" sz="1600" dirty="0" smtClean="0"/>
-              <a:t>(1 2 3)</a:t>
-            </a:r>
+              <a:rPr lang="en-US" sz="1600" dirty="0">
+                <a:solidFill>
+                  <a:srgbClr val="1C1C14"/>
+                </a:solidFill>
+                <a:latin typeface="Consolas"/>
+              </a:rPr>
+              <a:t> </a:t>
+            </a:r>
+            <a:r>
+              <a:rPr lang="en-US" sz="1600" dirty="0">
+                <a:solidFill>
+                  <a:prstClr val="black"/>
+                </a:solidFill>
+                <a:latin typeface="Consolas"/>
+              </a:rPr>
+              <a:t>a</a:t>
+            </a:r>
+            <a:r>
+              <a:rPr lang="en-US" sz="1600" dirty="0">
+                <a:solidFill>
+                  <a:srgbClr val="1C1C14"/>
+                </a:solidFill>
+                <a:latin typeface="Consolas"/>
+              </a:rPr>
+              <a:t> </a:t>
+            </a:r>
+            <a:r>
+              <a:rPr lang="en-US" sz="1600" b="1" dirty="0">
+                <a:solidFill>
+                  <a:srgbClr val="5E1445"/>
+                </a:solidFill>
+                <a:latin typeface="Consolas-Bold"/>
+              </a:rPr>
+              <a:t>(</a:t>
+            </a:r>
+            <a:r>
+              <a:rPr lang="en-US" sz="1600" dirty="0">
+                <a:solidFill>
+                  <a:srgbClr val="E03186"/>
+                </a:solidFill>
+                <a:latin typeface="Consolas"/>
+              </a:rPr>
+              <a:t>list</a:t>
+            </a:r>
+            <a:r>
+              <a:rPr lang="en-US" sz="1600" dirty="0">
+                <a:solidFill>
+                  <a:srgbClr val="1C1C14"/>
+                </a:solidFill>
+                <a:latin typeface="Consolas"/>
+              </a:rPr>
+              <a:t> </a:t>
+            </a:r>
+            <a:r>
+              <a:rPr lang="en-US" sz="1600" dirty="0">
+                <a:solidFill>
+                  <a:srgbClr val="3C8203"/>
+                </a:solidFill>
+                <a:latin typeface="Consolas"/>
+              </a:rPr>
+              <a:t>1</a:t>
+            </a:r>
+            <a:r>
+              <a:rPr lang="en-US" sz="1600" dirty="0">
+                <a:solidFill>
+                  <a:srgbClr val="1C1C14"/>
+                </a:solidFill>
+                <a:latin typeface="Consolas"/>
+              </a:rPr>
+              <a:t> </a:t>
+            </a:r>
+            <a:r>
+              <a:rPr lang="en-US" sz="1600" dirty="0">
+                <a:solidFill>
+                  <a:srgbClr val="3C8203"/>
+                </a:solidFill>
+                <a:latin typeface="Consolas"/>
+              </a:rPr>
+              <a:t>2</a:t>
+            </a:r>
+            <a:r>
+              <a:rPr lang="en-US" sz="1600" dirty="0">
+                <a:solidFill>
+                  <a:srgbClr val="1C1C14"/>
+                </a:solidFill>
+                <a:latin typeface="Consolas"/>
+              </a:rPr>
+              <a:t> </a:t>
+            </a:r>
+            <a:r>
+              <a:rPr lang="en-US" sz="1600" dirty="0">
+                <a:solidFill>
+                  <a:srgbClr val="3C8203"/>
+                </a:solidFill>
+                <a:latin typeface="Consolas"/>
+              </a:rPr>
+              <a:t>3</a:t>
+            </a:r>
+            <a:r>
+              <a:rPr lang="en-US" sz="1600" b="1" dirty="0">
+                <a:solidFill>
+                  <a:srgbClr val="5E1445"/>
+                </a:solidFill>
+                <a:latin typeface="Consolas-Bold"/>
+              </a:rPr>
+              <a:t>))</a:t>
+            </a:r>
+            <a:endParaRPr lang="en-US" sz="1600" dirty="0">
+              <a:solidFill>
+                <a:srgbClr val="1C1C14"/>
+              </a:solidFill>
+              <a:latin typeface="Consolas"/>
+            </a:endParaRPr>
           </a:p>
           <a:p>
             <a:pPr marL="0" indent="0">
               <a:buNone/>
             </a:pPr>
-            <a:endParaRPr lang="da-DK" sz="1600" dirty="0" smtClean="0"/>
+            <a:r>
+              <a:rPr lang="en-US" sz="1600" b="1" dirty="0" smtClean="0">
+                <a:solidFill>
+                  <a:srgbClr val="5E1445"/>
+                </a:solidFill>
+                <a:latin typeface="Consolas-Bold"/>
+              </a:rPr>
+              <a:t>=&gt; (1 2 3)</a:t>
+            </a:r>
           </a:p>
           <a:p>
             <a:pPr marL="0" indent="0">
               <a:buNone/>
             </a:pPr>
-            <a:r>
-              <a:rPr lang="da-DK" sz="1600" dirty="0" smtClean="0"/>
+            <a:endParaRPr lang="en-US" sz="1600" b="1" dirty="0">
+              <a:solidFill>
+                <a:srgbClr val="5E1445"/>
+              </a:solidFill>
+              <a:latin typeface="Consolas-Bold"/>
+            </a:endParaRPr>
+          </a:p>
+          <a:p>
+            <a:pPr marL="0" indent="0">
+              <a:buNone/>
+            </a:pPr>
+            <a:r>
+              <a:rPr lang="en-US" sz="1600" b="1" dirty="0" smtClean="0">
+                <a:solidFill>
+                  <a:srgbClr val="5E1445"/>
+                </a:solidFill>
+                <a:latin typeface="Consolas-Bold"/>
+              </a:rPr>
               <a:t>(</a:t>
             </a:r>
             <a:r>
-              <a:rPr lang="da-DK" sz="1600" dirty="0" err="1" smtClean="0"/>
+              <a:rPr lang="en-US" sz="1600" dirty="0" err="1">
+                <a:solidFill>
+                  <a:srgbClr val="515151"/>
+                </a:solidFill>
+                <a:latin typeface="Consolas"/>
+              </a:rPr>
               <a:t>def</a:t>
             </a:r>
             <a:r>
-              <a:rPr lang="da-DK" sz="1600" dirty="0" smtClean="0"/>
-              <a:t> b (rest a))</a:t>
-            </a:r>
-          </a:p>
-          <a:p>
-            <a:pPr>
-              <a:buFont typeface="Symbol" charset="0"/>
-              <a:buChar char=""/>
-            </a:pPr>
-            <a:r>
-              <a:rPr lang="da-DK" sz="1600" dirty="0" smtClean="0"/>
-              <a:t>(2 3)</a:t>
+              <a:rPr lang="en-US" sz="1600" dirty="0">
+                <a:solidFill>
+                  <a:srgbClr val="1C1C14"/>
+                </a:solidFill>
+                <a:latin typeface="Consolas"/>
+              </a:rPr>
+              <a:t> </a:t>
+            </a:r>
+            <a:r>
+              <a:rPr lang="en-US" sz="1600" dirty="0">
+                <a:solidFill>
+                  <a:prstClr val="black"/>
+                </a:solidFill>
+                <a:latin typeface="Consolas"/>
+              </a:rPr>
+              <a:t>b</a:t>
+            </a:r>
+            <a:r>
+              <a:rPr lang="en-US" sz="1600" dirty="0">
+                <a:solidFill>
+                  <a:srgbClr val="1C1C14"/>
+                </a:solidFill>
+                <a:latin typeface="Consolas"/>
+              </a:rPr>
+              <a:t> </a:t>
+            </a:r>
+            <a:r>
+              <a:rPr lang="en-US" sz="1600" b="1" dirty="0">
+                <a:solidFill>
+                  <a:srgbClr val="5E1445"/>
+                </a:solidFill>
+                <a:latin typeface="Consolas-Bold"/>
+              </a:rPr>
+              <a:t>(</a:t>
+            </a:r>
+            <a:r>
+              <a:rPr lang="en-US" sz="1600" dirty="0">
+                <a:solidFill>
+                  <a:srgbClr val="E03186"/>
+                </a:solidFill>
+                <a:latin typeface="Consolas"/>
+              </a:rPr>
+              <a:t>rest</a:t>
+            </a:r>
+            <a:r>
+              <a:rPr lang="en-US" sz="1600" dirty="0">
+                <a:solidFill>
+                  <a:srgbClr val="1C1C14"/>
+                </a:solidFill>
+                <a:latin typeface="Consolas"/>
+              </a:rPr>
+              <a:t> </a:t>
+            </a:r>
+            <a:r>
+              <a:rPr lang="en-US" sz="1600" dirty="0">
+                <a:solidFill>
+                  <a:prstClr val="black"/>
+                </a:solidFill>
+                <a:latin typeface="Consolas"/>
+              </a:rPr>
+              <a:t>a</a:t>
+            </a:r>
+            <a:r>
+              <a:rPr lang="en-US" sz="1600" b="1" dirty="0">
+                <a:solidFill>
+                  <a:srgbClr val="5E1445"/>
+                </a:solidFill>
+                <a:latin typeface="Consolas-Bold"/>
+              </a:rPr>
+              <a:t>)</a:t>
+            </a:r>
+            <a:r>
+              <a:rPr lang="en-US" sz="1600" b="1" dirty="0" smtClean="0">
+                <a:solidFill>
+                  <a:srgbClr val="5E1445"/>
+                </a:solidFill>
+                <a:latin typeface="Consolas-Bold"/>
+              </a:rPr>
+              <a:t>)</a:t>
             </a:r>
           </a:p>
           <a:p>
             <a:pPr marL="0" indent="0">
               <a:buNone/>
             </a:pPr>
-            <a:endParaRPr lang="da-DK" sz="1600" dirty="0" smtClean="0"/>
+            <a:r>
+              <a:rPr lang="en-US" sz="1600" b="1" dirty="0" smtClean="0">
+                <a:solidFill>
+                  <a:srgbClr val="5E1445"/>
+                </a:solidFill>
+                <a:latin typeface="Consolas-Bold"/>
+              </a:rPr>
+              <a:t>=&gt; (2 3)</a:t>
+            </a:r>
+            <a:endParaRPr lang="en-US" sz="1600" b="1" dirty="0">
+              <a:solidFill>
+                <a:srgbClr val="5E1445"/>
+              </a:solidFill>
+              <a:latin typeface="Consolas-Bold"/>
+            </a:endParaRPr>
           </a:p>
           <a:p>
             <a:pPr marL="0" indent="0">
               <a:buNone/>
             </a:pPr>
-            <a:r>
-              <a:rPr lang="da-DK" sz="1600" dirty="0" smtClean="0"/>
+            <a:endParaRPr lang="en-US" sz="1600" dirty="0">
+              <a:solidFill>
+                <a:srgbClr val="1C1C14"/>
+              </a:solidFill>
+              <a:latin typeface="Consolas"/>
+            </a:endParaRPr>
+          </a:p>
+          <a:p>
+            <a:pPr marL="0" indent="0">
+              <a:buNone/>
+            </a:pPr>
+            <a:r>
+              <a:rPr lang="hr-HR" sz="1600" b="1" dirty="0">
+                <a:solidFill>
+                  <a:srgbClr val="5E1445"/>
+                </a:solidFill>
+                <a:latin typeface="Consolas-Bold"/>
+              </a:rPr>
               <a:t>(</a:t>
             </a:r>
             <a:r>
-              <a:rPr lang="da-DK" sz="1600" dirty="0" err="1" smtClean="0"/>
+              <a:rPr lang="hr-HR" sz="1600" dirty="0">
+                <a:solidFill>
+                  <a:srgbClr val="515151"/>
+                </a:solidFill>
+                <a:latin typeface="Consolas"/>
+              </a:rPr>
               <a:t>def</a:t>
             </a:r>
             <a:r>
-              <a:rPr lang="da-DK" sz="1600" dirty="0" smtClean="0"/>
-              <a:t> x (</a:t>
-            </a:r>
-            <a:r>
-              <a:rPr lang="da-DK" sz="1600" dirty="0" err="1" smtClean="0"/>
+              <a:rPr lang="hr-HR" sz="1600" dirty="0">
+                <a:solidFill>
+                  <a:srgbClr val="1C1C14"/>
+                </a:solidFill>
+                <a:latin typeface="Consolas"/>
+              </a:rPr>
+              <a:t> </a:t>
+            </a:r>
+            <a:r>
+              <a:rPr lang="hr-HR" sz="1600" dirty="0">
+                <a:solidFill>
+                  <a:prstClr val="black"/>
+                </a:solidFill>
+                <a:latin typeface="Consolas"/>
+              </a:rPr>
+              <a:t>x</a:t>
+            </a:r>
+            <a:r>
+              <a:rPr lang="hr-HR" sz="1600" dirty="0">
+                <a:solidFill>
+                  <a:srgbClr val="1C1C14"/>
+                </a:solidFill>
+                <a:latin typeface="Consolas"/>
+              </a:rPr>
+              <a:t> </a:t>
+            </a:r>
+            <a:r>
+              <a:rPr lang="hr-HR" sz="1600" b="1" dirty="0">
+                <a:solidFill>
+                  <a:srgbClr val="5E1445"/>
+                </a:solidFill>
+                <a:latin typeface="Consolas-Bold"/>
+              </a:rPr>
+              <a:t>(</a:t>
+            </a:r>
+            <a:r>
+              <a:rPr lang="hr-HR" sz="1600" dirty="0">
+                <a:solidFill>
+                  <a:srgbClr val="E03186"/>
+                </a:solidFill>
+                <a:latin typeface="Consolas"/>
+              </a:rPr>
               <a:t>conj</a:t>
             </a:r>
             <a:r>
-              <a:rPr lang="da-DK" sz="1600" dirty="0" smtClean="0"/>
-              <a:t> ”x” b))</a:t>
-            </a:r>
-          </a:p>
-          <a:p>
-            <a:pPr>
-              <a:buFont typeface="Symbol" charset="0"/>
-              <a:buChar char=""/>
-            </a:pPr>
-            <a:r>
-              <a:rPr lang="da-DK" sz="1600" dirty="0" smtClean="0"/>
-              <a:t>(”x” 2 3)</a:t>
+              <a:rPr lang="hr-HR" sz="1600" dirty="0">
+                <a:solidFill>
+                  <a:srgbClr val="1C1C14"/>
+                </a:solidFill>
+                <a:latin typeface="Consolas"/>
+              </a:rPr>
+              <a:t> </a:t>
+            </a:r>
+            <a:r>
+              <a:rPr lang="hr-HR" sz="1600" dirty="0">
+                <a:solidFill>
+                  <a:prstClr val="black"/>
+                </a:solidFill>
+                <a:latin typeface="Consolas"/>
+              </a:rPr>
+              <a:t>b</a:t>
+            </a:r>
+            <a:r>
+              <a:rPr lang="hr-HR" sz="1600" dirty="0">
+                <a:solidFill>
+                  <a:srgbClr val="1C1C14"/>
+                </a:solidFill>
+                <a:latin typeface="Consolas"/>
+              </a:rPr>
+              <a:t> </a:t>
+            </a:r>
+            <a:r>
+              <a:rPr lang="hr-HR" sz="1600" dirty="0">
+                <a:solidFill>
+                  <a:srgbClr val="0029FA"/>
+                </a:solidFill>
+                <a:latin typeface="Consolas"/>
+              </a:rPr>
+              <a:t>"x"</a:t>
+            </a:r>
+            <a:r>
+              <a:rPr lang="hr-HR" sz="1600" b="1" dirty="0">
+                <a:solidFill>
+                  <a:srgbClr val="5E1445"/>
+                </a:solidFill>
+                <a:latin typeface="Consolas-Bold"/>
+              </a:rPr>
+              <a:t>)</a:t>
+            </a:r>
+            <a:r>
+              <a:rPr lang="hr-HR" sz="1600" b="1" dirty="0" smtClean="0">
+                <a:solidFill>
+                  <a:srgbClr val="5E1445"/>
+                </a:solidFill>
+                <a:latin typeface="Consolas-Bold"/>
+              </a:rPr>
+              <a:t>)</a:t>
             </a:r>
           </a:p>
           <a:p>
             <a:pPr marL="0" indent="0">
               <a:buNone/>
             </a:pPr>
-            <a:endParaRPr lang="da-DK" sz="1600" dirty="0" smtClean="0"/>
+            <a:r>
+              <a:rPr lang="hr-HR" sz="1600" b="1" dirty="0" smtClean="0">
+                <a:solidFill>
+                  <a:srgbClr val="5E1445"/>
+                </a:solidFill>
+                <a:latin typeface="Consolas-Bold"/>
+              </a:rPr>
+              <a:t>=&gt; (</a:t>
+            </a:r>
+            <a:r>
+              <a:rPr lang="hr-HR" sz="1600" dirty="0">
+                <a:solidFill>
+                  <a:srgbClr val="0029FA"/>
+                </a:solidFill>
+                <a:latin typeface="Consolas"/>
+              </a:rPr>
+              <a:t>"x"</a:t>
+            </a:r>
+            <a:r>
+              <a:rPr lang="hr-HR" sz="1600" b="1" dirty="0" smtClean="0">
+                <a:solidFill>
+                  <a:srgbClr val="5E1445"/>
+                </a:solidFill>
+                <a:latin typeface="Consolas-Bold"/>
+              </a:rPr>
+              <a:t> 2 3)</a:t>
+            </a:r>
+            <a:r>
+              <a:rPr lang="hr-HR" sz="1600" b="1" dirty="0">
+                <a:solidFill>
+                  <a:srgbClr val="5E1445"/>
+                </a:solidFill>
+                <a:latin typeface="Consolas-Bold"/>
+              </a:rPr>
+              <a:t>	</a:t>
+            </a:r>
           </a:p>
         </p:txBody>
       </p:sp>
@@ -10105,7 +10414,7 @@
         </p:nvSpPr>
         <p:spPr bwMode="auto">
           <a:xfrm>
-            <a:off x="5364088" y="2996952"/>
+            <a:off x="5364088" y="3219161"/>
             <a:ext cx="504056" cy="504056"/>
           </a:xfrm>
           <a:prstGeom prst="ellipse">
@@ -10165,7 +10474,7 @@
         </p:nvCxnSpPr>
         <p:spPr bwMode="auto">
           <a:xfrm flipV="1">
-            <a:off x="5794327" y="2456892"/>
+            <a:off x="5794327" y="2679101"/>
             <a:ext cx="721889" cy="613877"/>
           </a:xfrm>
           <a:prstGeom prst="straightConnector1">
@@ -10194,7 +10503,7 @@
         </p:nvSpPr>
         <p:spPr bwMode="auto">
           <a:xfrm>
-            <a:off x="4237484" y="3645024"/>
+            <a:off x="4237484" y="3867233"/>
             <a:ext cx="504056" cy="504056"/>
           </a:xfrm>
           <a:prstGeom prst="ellipse">
@@ -10251,7 +10560,7 @@
         </p:nvSpPr>
         <p:spPr bwMode="auto">
           <a:xfrm>
-            <a:off x="6516216" y="3645024"/>
+            <a:off x="6516216" y="3867233"/>
             <a:ext cx="381000" cy="504056"/>
           </a:xfrm>
           <a:prstGeom prst="rect">
@@ -10323,7 +10632,7 @@
         </p:nvCxnSpPr>
         <p:spPr bwMode="auto">
           <a:xfrm>
-            <a:off x="4741540" y="3897052"/>
+            <a:off x="4741540" y="4119261"/>
             <a:ext cx="1774676" cy="0"/>
           </a:xfrm>
           <a:prstGeom prst="straightConnector1">
@@ -10355,7 +10664,7 @@
         </p:nvCxnSpPr>
         <p:spPr bwMode="auto">
           <a:xfrm flipV="1">
-            <a:off x="6706716" y="2708920"/>
+            <a:off x="6706716" y="2931129"/>
             <a:ext cx="0" cy="936104"/>
           </a:xfrm>
           <a:prstGeom prst="straightConnector1">
@@ -15289,9 +15598,6 @@
               </a:rPr>
               <a:t>Seller’</a:t>
             </a:r>
-            <a:endParaRPr lang="en-US" dirty="0" smtClean="0">
-              <a:latin typeface="Neo Sans Std"/>
-            </a:endParaRPr>
           </a:p>
         </p:txBody>
       </p:sp>
@@ -15338,9 +15644,6 @@
               </a:rPr>
               <a:t>Buyer’</a:t>
             </a:r>
-            <a:endParaRPr lang="en-US" dirty="0" smtClean="0">
-              <a:latin typeface="Neo Sans Std"/>
-            </a:endParaRPr>
           </a:p>
         </p:txBody>
       </p:sp>
@@ -15820,7 +16123,6 @@
               <a:rPr lang="en-US" dirty="0" smtClean="0"/>
               <a:t>Interoperable</a:t>
             </a:r>
-            <a:endParaRPr lang="en-US" dirty="0" smtClean="0"/>
           </a:p>
           <a:p>
             <a:r>
@@ -19333,11 +19635,7 @@
           <a:p>
             <a:r>
               <a:rPr lang="en-US" dirty="0" smtClean="0"/>
-              <a:t>Classes are </a:t>
-            </a:r>
-            <a:r>
-              <a:rPr lang="en-US" dirty="0" smtClean="0"/>
-              <a:t>Islands</a:t>
+              <a:t>Classes are Islands</a:t>
             </a:r>
             <a:endParaRPr lang="en-US" dirty="0"/>
           </a:p>
@@ -19519,10 +19817,6 @@
               </a:rPr>
               <a:t>Equals</a:t>
             </a:r>
-            <a:endParaRPr lang="en-US" sz="1600" dirty="0" smtClean="0">
-              <a:latin typeface="Courier"/>
-              <a:cs typeface="Courier"/>
-            </a:endParaRPr>
           </a:p>
           <a:p>
             <a:pPr marL="0" indent="0">
@@ -19724,13 +20018,8 @@
             </a:pPr>
             <a:r>
               <a:rPr lang="en-US" sz="1600" dirty="0" smtClean="0"/>
-              <a:t>;; </a:t>
-            </a:r>
-            <a:r>
-              <a:rPr lang="en-US" sz="1600" dirty="0" smtClean="0"/>
-              <a:t>a record is also a map of its properties</a:t>
-            </a:r>
-            <a:endParaRPr lang="en-US" sz="1600" dirty="0" smtClean="0"/>
+              <a:t>;; a record is also a map of its properties</a:t>
+            </a:r>
           </a:p>
           <a:p>
             <a:pPr marL="0" indent="0">
@@ -19949,6 +20238,18 @@
                 <a:latin typeface="Courier"/>
                 <a:cs typeface="Courier"/>
               </a:rPr>
+              <a:t> result = new Diff();</a:t>
+            </a:r>
+          </a:p>
+          <a:p>
+            <a:pPr marL="0" indent="0">
+              <a:buNone/>
+            </a:pPr>
+            <a:r>
+              <a:rPr lang="en-US" sz="1200" dirty="0">
+                <a:latin typeface="Courier"/>
+                <a:cs typeface="Courier"/>
+              </a:rPr>
               <a:t> </a:t>
             </a:r>
             <a:r>
@@ -19956,8 +20257,156 @@
                 <a:latin typeface="Courier"/>
                 <a:cs typeface="Courier"/>
               </a:rPr>
-              <a:t>result = new Diff();</a:t>
-            </a:r>
+              <a:t> if (!(</a:t>
+            </a:r>
+            <a:r>
+              <a:rPr lang="en-US" sz="1200" dirty="0" err="1" smtClean="0">
+                <a:latin typeface="Courier"/>
+                <a:cs typeface="Courier"/>
+              </a:rPr>
+              <a:t>this.Bid.Equals</a:t>
+            </a:r>
+            <a:r>
+              <a:rPr lang="en-US" sz="1200" dirty="0" smtClean="0">
+                <a:latin typeface="Courier"/>
+                <a:cs typeface="Courier"/>
+              </a:rPr>
+              <a:t>(</a:t>
+            </a:r>
+            <a:r>
+              <a:rPr lang="en-US" sz="1200" dirty="0" err="1" smtClean="0">
+                <a:latin typeface="Courier"/>
+                <a:cs typeface="Courier"/>
+              </a:rPr>
+              <a:t>prev.Bid</a:t>
+            </a:r>
+            <a:r>
+              <a:rPr lang="en-US" sz="1200" dirty="0" smtClean="0">
+                <a:latin typeface="Courier"/>
+                <a:cs typeface="Courier"/>
+              </a:rPr>
+              <a:t>))) </a:t>
+            </a:r>
+            <a:endParaRPr lang="en-US" sz="1200" dirty="0">
+              <a:latin typeface="Courier"/>
+              <a:cs typeface="Courier"/>
+            </a:endParaRPr>
+          </a:p>
+          <a:p>
+            <a:pPr marL="0" indent="0">
+              <a:buNone/>
+            </a:pPr>
+            <a:r>
+              <a:rPr lang="en-US" sz="1200" dirty="0">
+                <a:latin typeface="Courier"/>
+                <a:cs typeface="Courier"/>
+              </a:rPr>
+              <a:t> </a:t>
+            </a:r>
+            <a:r>
+              <a:rPr lang="en-US" sz="1200" dirty="0" smtClean="0">
+                <a:latin typeface="Courier"/>
+                <a:cs typeface="Courier"/>
+              </a:rPr>
+              <a:t>   </a:t>
+            </a:r>
+            <a:r>
+              <a:rPr lang="en-US" sz="1200" dirty="0" err="1" smtClean="0">
+                <a:latin typeface="Courier"/>
+                <a:cs typeface="Courier"/>
+              </a:rPr>
+              <a:t>result.AddFieldUpdate</a:t>
+            </a:r>
+            <a:r>
+              <a:rPr lang="en-US" sz="1200" dirty="0" smtClean="0">
+                <a:latin typeface="Courier"/>
+                <a:cs typeface="Courier"/>
+              </a:rPr>
+              <a:t>(</a:t>
+            </a:r>
+            <a:r>
+              <a:rPr lang="en-US" sz="1200" dirty="0" err="1" smtClean="0">
+                <a:latin typeface="Courier"/>
+                <a:cs typeface="Courier"/>
+              </a:rPr>
+              <a:t>QuoteField.Bid</a:t>
+            </a:r>
+            <a:r>
+              <a:rPr lang="en-US" sz="1200" dirty="0" smtClean="0">
+                <a:latin typeface="Courier"/>
+                <a:cs typeface="Courier"/>
+              </a:rPr>
+              <a:t>, </a:t>
+            </a:r>
+            <a:r>
+              <a:rPr lang="en-US" sz="1200" dirty="0" err="1" smtClean="0">
+                <a:latin typeface="Courier"/>
+                <a:cs typeface="Courier"/>
+              </a:rPr>
+              <a:t>this.Bid</a:t>
+            </a:r>
+            <a:r>
+              <a:rPr lang="en-US" sz="1200" dirty="0" smtClean="0">
+                <a:latin typeface="Courier"/>
+                <a:cs typeface="Courier"/>
+              </a:rPr>
+              <a:t>));</a:t>
+            </a:r>
+          </a:p>
+          <a:p>
+            <a:pPr marL="0" indent="0">
+              <a:buNone/>
+            </a:pPr>
+            <a:r>
+              <a:rPr lang="en-US" sz="1200" dirty="0">
+                <a:latin typeface="Courier"/>
+                <a:cs typeface="Courier"/>
+              </a:rPr>
+              <a:t> </a:t>
+            </a:r>
+            <a:r>
+              <a:rPr lang="en-US" sz="1200" dirty="0" smtClean="0">
+                <a:latin typeface="Courier"/>
+                <a:cs typeface="Courier"/>
+              </a:rPr>
+              <a:t> …</a:t>
+            </a:r>
+          </a:p>
+          <a:p>
+            <a:pPr marL="0" indent="0">
+              <a:buNone/>
+            </a:pPr>
+            <a:r>
+              <a:rPr lang="en-US" sz="1200" dirty="0">
+                <a:latin typeface="Courier"/>
+                <a:cs typeface="Courier"/>
+              </a:rPr>
+              <a:t> </a:t>
+            </a:r>
+            <a:r>
+              <a:rPr lang="en-US" sz="1200" dirty="0" smtClean="0">
+                <a:latin typeface="Courier"/>
+                <a:cs typeface="Courier"/>
+              </a:rPr>
+              <a:t> // repeat for the other fields </a:t>
+            </a:r>
+          </a:p>
+          <a:p>
+            <a:pPr marL="0" indent="0">
+              <a:buNone/>
+            </a:pPr>
+            <a:r>
+              <a:rPr lang="en-US" sz="1200" dirty="0" smtClean="0">
+                <a:latin typeface="Courier"/>
+                <a:cs typeface="Courier"/>
+              </a:rPr>
+              <a:t>}</a:t>
+            </a:r>
+          </a:p>
+          <a:p>
+            <a:pPr marL="0" indent="0">
+              <a:buNone/>
+            </a:pPr>
             <a:endParaRPr lang="en-US" sz="1200" dirty="0" smtClean="0">
               <a:latin typeface="Courier"/>
               <a:cs typeface="Courier"/>
@@ -19972,43 +20421,25 @@
                 <a:latin typeface="Courier"/>
                 <a:cs typeface="Courier"/>
               </a:rPr>
-              <a:t> </a:t>
-            </a:r>
-            <a:r>
-              <a:rPr lang="en-US" sz="1200" dirty="0" smtClean="0">
+              <a:t>previous = Quote(EURUSD, Bid:=1.40, Ask:=1.41)</a:t>
+            </a:r>
+          </a:p>
+          <a:p>
+            <a:pPr marL="0" indent="0">
+              <a:buNone/>
+            </a:pPr>
+            <a:r>
+              <a:rPr lang="en-US" sz="1200" dirty="0">
                 <a:latin typeface="Courier"/>
                 <a:cs typeface="Courier"/>
               </a:rPr>
-              <a:t> if (!(</a:t>
-            </a:r>
-            <a:r>
-              <a:rPr lang="en-US" sz="1200" dirty="0" err="1" smtClean="0">
-                <a:latin typeface="Courier"/>
-                <a:cs typeface="Courier"/>
-              </a:rPr>
-              <a:t>this.Bid.Equals</a:t>
-            </a:r>
-            <a:r>
-              <a:rPr lang="en-US" sz="1200" dirty="0" smtClean="0">
-                <a:latin typeface="Courier"/>
-                <a:cs typeface="Courier"/>
-              </a:rPr>
-              <a:t>(</a:t>
-            </a:r>
-            <a:r>
-              <a:rPr lang="en-US" sz="1200" dirty="0" err="1" smtClean="0">
-                <a:latin typeface="Courier"/>
-                <a:cs typeface="Courier"/>
-              </a:rPr>
-              <a:t>prev.Bid</a:t>
-            </a:r>
-            <a:r>
-              <a:rPr lang="en-US" sz="1200" dirty="0" smtClean="0">
-                <a:latin typeface="Courier"/>
-                <a:cs typeface="Courier"/>
-              </a:rPr>
-              <a:t>))) </a:t>
-            </a:r>
+              <a:t>latest   = Quote(EURUSD, Bid:=1.45, Ask:=1.46)</a:t>
+            </a:r>
+          </a:p>
+          <a:p>
+            <a:pPr marL="0" indent="0">
+              <a:buNone/>
+            </a:pPr>
             <a:endParaRPr lang="en-US" sz="1200" dirty="0">
               <a:latin typeface="Courier"/>
               <a:cs typeface="Courier"/>
@@ -20018,68 +20449,100 @@
             <a:pPr marL="0" indent="0">
               <a:buNone/>
             </a:pPr>
-            <a:r>
-              <a:rPr lang="en-US" sz="1200" dirty="0">
-                <a:latin typeface="Courier"/>
-                <a:cs typeface="Courier"/>
-              </a:rPr>
-              <a:t> </a:t>
-            </a:r>
+            <a:endParaRPr lang="en-US" sz="1200" dirty="0">
+              <a:latin typeface="Courier"/>
+              <a:cs typeface="Courier"/>
+            </a:endParaRPr>
+          </a:p>
+          <a:p>
+            <a:pPr marL="0" indent="0">
+              <a:buNone/>
+            </a:pPr>
             <a:r>
               <a:rPr lang="en-US" sz="1200" dirty="0" smtClean="0">
                 <a:latin typeface="Courier"/>
                 <a:cs typeface="Courier"/>
               </a:rPr>
-              <a:t>   </a:t>
+              <a:t>diff = </a:t>
             </a:r>
             <a:r>
               <a:rPr lang="en-US" sz="1200" dirty="0" err="1" smtClean="0">
                 <a:latin typeface="Courier"/>
                 <a:cs typeface="Courier"/>
               </a:rPr>
-              <a:t>result.AddFieldUpdate</a:t>
+              <a:t>latest.ChangesSince</a:t>
             </a:r>
             <a:r>
               <a:rPr lang="en-US" sz="1200" dirty="0" smtClean="0">
                 <a:latin typeface="Courier"/>
                 <a:cs typeface="Courier"/>
               </a:rPr>
-              <a:t>(</a:t>
-            </a:r>
-            <a:r>
-              <a:rPr lang="en-US" sz="1200" dirty="0" err="1" smtClean="0">
-                <a:latin typeface="Courier"/>
-                <a:cs typeface="Courier"/>
-              </a:rPr>
-              <a:t>QuoteField.Bid</a:t>
-            </a:r>
-            <a:r>
-              <a:rPr lang="en-US" sz="1200" dirty="0" smtClean="0">
-                <a:latin typeface="Courier"/>
-                <a:cs typeface="Courier"/>
-              </a:rPr>
-              <a:t>, </a:t>
-            </a:r>
-            <a:r>
-              <a:rPr lang="en-US" sz="1200" dirty="0" err="1" smtClean="0">
-                <a:latin typeface="Courier"/>
-                <a:cs typeface="Courier"/>
-              </a:rPr>
-              <a:t>this.Bid</a:t>
-            </a:r>
-            <a:r>
-              <a:rPr lang="en-US" sz="1200" dirty="0" smtClean="0">
-                <a:latin typeface="Courier"/>
-                <a:cs typeface="Courier"/>
-              </a:rPr>
-              <a:t>));</a:t>
-            </a:r>
+              <a:t>(previous)</a:t>
+            </a:r>
+          </a:p>
+          <a:p>
+            <a:pPr marL="0" indent="0">
+              <a:buNone/>
+            </a:pPr>
             <a:endParaRPr lang="en-US" sz="1200" dirty="0" smtClean="0">
               <a:latin typeface="Courier"/>
               <a:cs typeface="Courier"/>
             </a:endParaRPr>
           </a:p>
           <a:p>
+            <a:pPr>
+              <a:buFont typeface="Symbol" charset="0"/>
+              <a:buChar char=""/>
+            </a:pPr>
+            <a:r>
+              <a:rPr lang="en-US" sz="1200" dirty="0" smtClean="0">
+                <a:latin typeface="Courier"/>
+                <a:cs typeface="Courier"/>
+              </a:rPr>
+              <a:t>Diff with Updates:     </a:t>
+            </a:r>
+          </a:p>
+          <a:p>
+            <a:pPr marL="0" indent="0">
+              <a:buNone/>
+            </a:pPr>
+            <a:r>
+              <a:rPr lang="en-US" sz="1200" dirty="0" smtClean="0">
+                <a:latin typeface="Courier"/>
+                <a:cs typeface="Courier"/>
+              </a:rPr>
+              <a:t>        (Field </a:t>
+            </a:r>
+            <a:r>
+              <a:rPr lang="en-US" sz="1200" dirty="0" err="1" smtClean="0">
+                <a:latin typeface="Courier"/>
+                <a:cs typeface="Courier"/>
+              </a:rPr>
+              <a:t>QuoteField.Bid</a:t>
+            </a:r>
+            <a:r>
+              <a:rPr lang="en-US" sz="1200" dirty="0" smtClean="0">
+                <a:latin typeface="Courier"/>
+                <a:cs typeface="Courier"/>
+              </a:rPr>
+              <a:t>, </a:t>
+            </a:r>
+            <a:r>
+              <a:rPr lang="en-US" sz="1200" dirty="0" err="1" smtClean="0">
+                <a:latin typeface="Courier"/>
+                <a:cs typeface="Courier"/>
+              </a:rPr>
+              <a:t>NewValue</a:t>
+            </a:r>
+            <a:r>
+              <a:rPr lang="en-US" sz="1200" dirty="0" smtClean="0">
+                <a:latin typeface="Courier"/>
+                <a:cs typeface="Courier"/>
+              </a:rPr>
+              <a:t> 1.405) </a:t>
+            </a:r>
+          </a:p>
+          <a:p>
             <a:pPr marL="0" indent="0">
               <a:buNone/>
             </a:pPr>
@@ -20095,242 +20558,7 @@
                 <a:latin typeface="Courier"/>
                 <a:cs typeface="Courier"/>
               </a:rPr>
-              <a:t> </a:t>
-            </a:r>
-            <a:r>
-              <a:rPr lang="en-US" sz="1200" dirty="0" smtClean="0">
-                <a:latin typeface="Courier"/>
-                <a:cs typeface="Courier"/>
-              </a:rPr>
-              <a:t>…</a:t>
-            </a:r>
-          </a:p>
-          <a:p>
-            <a:pPr marL="0" indent="0">
-              <a:buNone/>
-            </a:pPr>
-            <a:r>
-              <a:rPr lang="en-US" sz="1200" dirty="0">
-                <a:latin typeface="Courier"/>
-                <a:cs typeface="Courier"/>
-              </a:rPr>
-              <a:t> </a:t>
-            </a:r>
-            <a:r>
-              <a:rPr lang="en-US" sz="1200" dirty="0" smtClean="0">
-                <a:latin typeface="Courier"/>
-                <a:cs typeface="Courier"/>
-              </a:rPr>
-              <a:t> // repeat for the other fields</a:t>
-            </a:r>
-            <a:r>
-              <a:rPr lang="en-US" sz="1200" dirty="0" smtClean="0">
-                <a:latin typeface="Courier"/>
-                <a:cs typeface="Courier"/>
-              </a:rPr>
-              <a:t> </a:t>
-            </a:r>
-            <a:endParaRPr lang="en-US" sz="1200" dirty="0" smtClean="0">
-              <a:latin typeface="Courier"/>
-              <a:cs typeface="Courier"/>
-            </a:endParaRPr>
-          </a:p>
-          <a:p>
-            <a:pPr marL="0" indent="0">
-              <a:buNone/>
-            </a:pPr>
-            <a:r>
-              <a:rPr lang="en-US" sz="1200" dirty="0" smtClean="0">
-                <a:latin typeface="Courier"/>
-                <a:cs typeface="Courier"/>
-              </a:rPr>
-              <a:t>}</a:t>
-            </a:r>
-          </a:p>
-          <a:p>
-            <a:pPr marL="0" indent="0">
-              <a:buNone/>
-            </a:pPr>
-            <a:endParaRPr lang="en-US" sz="1200" dirty="0" smtClean="0">
-              <a:latin typeface="Courier"/>
-              <a:cs typeface="Courier"/>
-            </a:endParaRPr>
-          </a:p>
-          <a:p>
-            <a:pPr marL="0" indent="0">
-              <a:buNone/>
-            </a:pPr>
-            <a:r>
-              <a:rPr lang="en-US" sz="1200" dirty="0">
-                <a:latin typeface="Courier"/>
-                <a:cs typeface="Courier"/>
-              </a:rPr>
-              <a:t>previous = Quote(EURUSD, Bid:=1.40, Ask:=1.41)</a:t>
-            </a:r>
-          </a:p>
-          <a:p>
-            <a:pPr marL="0" indent="0">
-              <a:buNone/>
-            </a:pPr>
-            <a:r>
-              <a:rPr lang="en-US" sz="1200" dirty="0">
-                <a:latin typeface="Courier"/>
-                <a:cs typeface="Courier"/>
-              </a:rPr>
-              <a:t>latest   = Quote(EURUSD, Bid:=1.45, Ask:=1.46)</a:t>
-            </a:r>
-          </a:p>
-          <a:p>
-            <a:pPr marL="0" indent="0">
-              <a:buNone/>
-            </a:pPr>
-            <a:endParaRPr lang="en-US" sz="1200" dirty="0">
-              <a:latin typeface="Courier"/>
-              <a:cs typeface="Courier"/>
-            </a:endParaRPr>
-          </a:p>
-          <a:p>
-            <a:pPr marL="0" indent="0">
-              <a:buNone/>
-            </a:pPr>
-            <a:endParaRPr lang="en-US" sz="1200" dirty="0">
-              <a:latin typeface="Courier"/>
-              <a:cs typeface="Courier"/>
-            </a:endParaRPr>
-          </a:p>
-          <a:p>
-            <a:pPr marL="0" indent="0">
-              <a:buNone/>
-            </a:pPr>
-            <a:r>
-              <a:rPr lang="en-US" sz="1200" dirty="0" smtClean="0">
-                <a:latin typeface="Courier"/>
-                <a:cs typeface="Courier"/>
-              </a:rPr>
-              <a:t>diff = </a:t>
-            </a:r>
-            <a:r>
-              <a:rPr lang="en-US" sz="1200" dirty="0" err="1" smtClean="0">
-                <a:latin typeface="Courier"/>
-                <a:cs typeface="Courier"/>
-              </a:rPr>
-              <a:t>latest.ChangesSince</a:t>
-            </a:r>
-            <a:r>
-              <a:rPr lang="en-US" sz="1200" dirty="0" smtClean="0">
-                <a:latin typeface="Courier"/>
-                <a:cs typeface="Courier"/>
-              </a:rPr>
-              <a:t>(previous)</a:t>
-            </a:r>
-          </a:p>
-          <a:p>
-            <a:pPr marL="0" indent="0">
-              <a:buNone/>
-            </a:pPr>
-            <a:endParaRPr lang="en-US" sz="1200" dirty="0" smtClean="0">
-              <a:latin typeface="Courier"/>
-              <a:cs typeface="Courier"/>
-            </a:endParaRPr>
-          </a:p>
-          <a:p>
-            <a:pPr>
-              <a:buFont typeface="Symbol" charset="0"/>
-              <a:buChar char=""/>
-            </a:pPr>
-            <a:r>
-              <a:rPr lang="en-US" sz="1200" dirty="0" smtClean="0">
-                <a:latin typeface="Courier"/>
-                <a:cs typeface="Courier"/>
-              </a:rPr>
-              <a:t>Diff with Updates:</a:t>
-            </a:r>
-            <a:r>
-              <a:rPr lang="en-US" sz="1200" dirty="0" smtClean="0">
-                <a:latin typeface="Courier"/>
-                <a:cs typeface="Courier"/>
-              </a:rPr>
-              <a:t>    </a:t>
-            </a:r>
-            <a:r>
-              <a:rPr lang="en-US" sz="1200" dirty="0" smtClean="0">
-                <a:latin typeface="Courier"/>
-                <a:cs typeface="Courier"/>
-              </a:rPr>
-              <a:t> </a:t>
-            </a:r>
-          </a:p>
-          <a:p>
-            <a:pPr marL="0" indent="0">
-              <a:buNone/>
-            </a:pPr>
-            <a:r>
-              <a:rPr lang="en-US" sz="1200" dirty="0" smtClean="0">
-                <a:latin typeface="Courier"/>
-                <a:cs typeface="Courier"/>
-              </a:rPr>
-              <a:t>        (Field </a:t>
-            </a:r>
-            <a:r>
-              <a:rPr lang="en-US" sz="1200" dirty="0" err="1" smtClean="0">
-                <a:latin typeface="Courier"/>
-                <a:cs typeface="Courier"/>
-              </a:rPr>
-              <a:t>QuoteField.Bid</a:t>
-            </a:r>
-            <a:r>
-              <a:rPr lang="en-US" sz="1200" dirty="0" smtClean="0">
-                <a:latin typeface="Courier"/>
-                <a:cs typeface="Courier"/>
-              </a:rPr>
-              <a:t>, </a:t>
-            </a:r>
-            <a:r>
-              <a:rPr lang="en-US" sz="1200" dirty="0" err="1" smtClean="0">
-                <a:latin typeface="Courier"/>
-                <a:cs typeface="Courier"/>
-              </a:rPr>
-              <a:t>NewValue</a:t>
-            </a:r>
-            <a:r>
-              <a:rPr lang="en-US" sz="1200" dirty="0" smtClean="0">
-                <a:latin typeface="Courier"/>
-                <a:cs typeface="Courier"/>
-              </a:rPr>
-              <a:t> 1.405</a:t>
-            </a:r>
-            <a:r>
-              <a:rPr lang="en-US" sz="1200" dirty="0" smtClean="0">
-                <a:latin typeface="Courier"/>
-                <a:cs typeface="Courier"/>
-              </a:rPr>
-              <a:t>) </a:t>
-            </a:r>
-          </a:p>
-          <a:p>
-            <a:pPr marL="0" indent="0">
-              <a:buNone/>
-            </a:pPr>
-            <a:r>
-              <a:rPr lang="en-US" sz="1200" dirty="0">
-                <a:latin typeface="Courier"/>
-                <a:cs typeface="Courier"/>
-              </a:rPr>
-              <a:t> </a:t>
-            </a:r>
-            <a:r>
-              <a:rPr lang="en-US" sz="1200" dirty="0" smtClean="0">
-                <a:latin typeface="Courier"/>
-                <a:cs typeface="Courier"/>
-              </a:rPr>
-              <a:t>       </a:t>
-            </a:r>
-            <a:r>
-              <a:rPr lang="en-US" sz="1200" dirty="0" smtClean="0">
-                <a:latin typeface="Courier"/>
-                <a:cs typeface="Courier"/>
-              </a:rPr>
-              <a:t>(Field </a:t>
+              <a:t>       (Field </a:t>
             </a:r>
             <a:r>
               <a:rPr lang="en-US" sz="1200" dirty="0" err="1" smtClean="0">
@@ -20366,15 +20594,7 @@
                 <a:cs typeface="Courier"/>
                 <a:sym typeface="Wingdings"/>
               </a:rPr>
-              <a:t>1.415</a:t>
-            </a:r>
-            <a:r>
-              <a:rPr lang="en-US" sz="1200" dirty="0" smtClean="0">
-                <a:latin typeface="Courier"/>
-                <a:cs typeface="Courier"/>
-                <a:sym typeface="Wingdings"/>
-              </a:rPr>
-              <a:t>)</a:t>
+              <a:t>1.415)</a:t>
             </a:r>
           </a:p>
           <a:p>
@@ -21717,18 +21937,7 @@
                           <a:ea typeface="Neo Sans Std"/>
                           <a:cs typeface="+mn-cs"/>
                         </a:rPr>
-                        <a:t> </a:t>
-                      </a:r>
-                      <a:r>
-                        <a:rPr lang="en-US" sz="1600" i="0" kern="1200" baseline="0" dirty="0" smtClean="0">
-                          <a:solidFill>
-                            <a:schemeClr val="dk1"/>
-                          </a:solidFill>
-                          <a:latin typeface="Neo Sans Std"/>
-                          <a:ea typeface="Neo Sans Std"/>
-                          <a:cs typeface="+mn-cs"/>
-                        </a:rPr>
-                        <a:t>programming, OO</a:t>
+                        <a:t> programming, OO</a:t>
                       </a:r>
                       <a:endParaRPr lang="en-US" sz="1600" i="0" dirty="0">
                         <a:latin typeface="Neo Sans Std"/>
@@ -25267,18 +25476,7 @@
                           <a:ea typeface="Neo Sans Std"/>
                           <a:cs typeface="+mn-cs"/>
                         </a:rPr>
-                        <a:t> </a:t>
-                      </a:r>
-                      <a:r>
-                        <a:rPr lang="en-US" sz="1600" i="0" kern="1200" baseline="0" dirty="0" smtClean="0">
-                          <a:solidFill>
-                            <a:schemeClr val="dk1"/>
-                          </a:solidFill>
-                          <a:latin typeface="Neo Sans Std"/>
-                          <a:ea typeface="Neo Sans Std"/>
-                          <a:cs typeface="+mn-cs"/>
-                        </a:rPr>
-                        <a:t>programming, OO</a:t>
+                        <a:t> programming, OO</a:t>
                       </a:r>
                       <a:endParaRPr lang="en-US" sz="1600" i="0" dirty="0">
                         <a:latin typeface="Neo Sans Std"/>
@@ -26091,8 +26289,13 @@
             </a:r>
             <a:r>
               <a:rPr lang="en-US" dirty="0" smtClean="0"/>
-              <a:t> (do.)</a:t>
-            </a:r>
+              <a:t> (</a:t>
+            </a:r>
+            <a:r>
+              <a:rPr lang="en-US" dirty="0" smtClean="0"/>
+              <a:t>ditto)</a:t>
+            </a:r>
+            <a:endParaRPr lang="en-US" dirty="0" smtClean="0"/>
           </a:p>
           <a:p>
             <a:r>
@@ -27652,14 +27855,7 @@
                 <a:latin typeface="Courier"/>
                 <a:cs typeface="Courier"/>
               </a:rPr>
-              <a:t>public </a:t>
-            </a:r>
-            <a:r>
-              <a:rPr lang="en-US" sz="1200" dirty="0" smtClean="0">
-                <a:latin typeface="Courier"/>
-                <a:cs typeface="Courier"/>
-              </a:rPr>
-              <a:t>class Name { </a:t>
+              <a:t>public class Name { </a:t>
             </a:r>
           </a:p>
           <a:p>
@@ -27742,21 +27938,59 @@
                 <a:latin typeface="Courier"/>
                 <a:cs typeface="Courier"/>
               </a:rPr>
-              <a:t>	public Person(Name name, </a:t>
+              <a:t>	public Person(Name name, List&lt;Person&gt; children) </a:t>
+            </a:r>
+          </a:p>
+          <a:p>
+            <a:pPr marL="0" indent="0">
+              <a:buNone/>
+            </a:pPr>
+            <a:r>
+              <a:rPr lang="en-US" sz="1200" dirty="0">
+                <a:latin typeface="Courier"/>
+                <a:cs typeface="Courier"/>
+              </a:rPr>
+              <a:t>	</a:t>
             </a:r>
             <a:r>
               <a:rPr lang="en-US" sz="1200" dirty="0" smtClean="0">
                 <a:latin typeface="Courier"/>
                 <a:cs typeface="Courier"/>
               </a:rPr>
-              <a:t>List&lt;Person&gt; </a:t>
+              <a:t>{</a:t>
+            </a:r>
+          </a:p>
+          <a:p>
+            <a:pPr marL="0" indent="0">
+              <a:buNone/>
+            </a:pPr>
+            <a:r>
+              <a:rPr lang="en-US" sz="1200" dirty="0">
+                <a:latin typeface="Courier"/>
+                <a:cs typeface="Courier"/>
+              </a:rPr>
+              <a:t>	</a:t>
             </a:r>
             <a:r>
               <a:rPr lang="en-US" sz="1200" dirty="0" smtClean="0">
                 <a:latin typeface="Courier"/>
                 <a:cs typeface="Courier"/>
               </a:rPr>
-              <a:t>children) </a:t>
+              <a:t>    </a:t>
+            </a:r>
+            <a:r>
+              <a:rPr lang="en-US" sz="1200" dirty="0" err="1" smtClean="0">
+                <a:latin typeface="Courier"/>
+                <a:cs typeface="Courier"/>
+              </a:rPr>
+              <a:t>this.Name</a:t>
+            </a:r>
+            <a:r>
+              <a:rPr lang="en-US" sz="1200" dirty="0" smtClean="0">
+                <a:latin typeface="Courier"/>
+                <a:cs typeface="Courier"/>
+              </a:rPr>
+              <a:t> = name; </a:t>
             </a:r>
           </a:p>
           <a:p>
@@ -27775,7 +28009,21 @@
                 <a:latin typeface="Courier"/>
                 <a:cs typeface="Courier"/>
               </a:rPr>
-              <a:t>{</a:t>
+              <a:t>    </a:t>
+            </a:r>
+            <a:r>
+              <a:rPr lang="en-US" sz="1200" dirty="0" err="1" smtClean="0">
+                <a:latin typeface="Courier"/>
+                <a:cs typeface="Courier"/>
+              </a:rPr>
+              <a:t>this.Children</a:t>
+            </a:r>
+            <a:r>
+              <a:rPr lang="en-US" sz="1200" dirty="0" smtClean="0">
+                <a:latin typeface="Courier"/>
+                <a:cs typeface="Courier"/>
+              </a:rPr>
+              <a:t> =  children; </a:t>
             </a:r>
           </a:p>
           <a:p>
@@ -27794,100 +28042,8 @@
                 <a:latin typeface="Courier"/>
                 <a:cs typeface="Courier"/>
               </a:rPr>
-              <a:t>    </a:t>
-            </a:r>
-            <a:r>
-              <a:rPr lang="en-US" sz="1200" dirty="0" err="1" smtClean="0">
-                <a:latin typeface="Courier"/>
-                <a:cs typeface="Courier"/>
-              </a:rPr>
-              <a:t>this.Name</a:t>
-            </a:r>
-            <a:r>
-              <a:rPr lang="en-US" sz="1200" dirty="0" smtClean="0">
-                <a:latin typeface="Courier"/>
-                <a:cs typeface="Courier"/>
-              </a:rPr>
-              <a:t> </a:t>
-            </a:r>
-            <a:r>
-              <a:rPr lang="en-US" sz="1200" dirty="0" smtClean="0">
-                <a:latin typeface="Courier"/>
-                <a:cs typeface="Courier"/>
-              </a:rPr>
-              <a:t>= name; </a:t>
-            </a:r>
-            <a:endParaRPr lang="en-US" sz="1200" dirty="0" smtClean="0">
-              <a:latin typeface="Courier"/>
-              <a:cs typeface="Courier"/>
-            </a:endParaRPr>
-          </a:p>
-          <a:p>
-            <a:pPr marL="0" indent="0">
-              <a:buNone/>
-            </a:pPr>
-            <a:r>
-              <a:rPr lang="en-US" sz="1200" dirty="0">
-                <a:latin typeface="Courier"/>
-                <a:cs typeface="Courier"/>
-              </a:rPr>
-              <a:t>	</a:t>
-            </a:r>
-            <a:r>
-              <a:rPr lang="en-US" sz="1200" dirty="0" smtClean="0">
-                <a:latin typeface="Courier"/>
-                <a:cs typeface="Courier"/>
-              </a:rPr>
-              <a:t>    </a:t>
-            </a:r>
-            <a:r>
-              <a:rPr lang="en-US" sz="1200" dirty="0" err="1" smtClean="0">
-                <a:latin typeface="Courier"/>
-                <a:cs typeface="Courier"/>
-              </a:rPr>
-              <a:t>this.Children</a:t>
-            </a:r>
-            <a:r>
-              <a:rPr lang="en-US" sz="1200" dirty="0" smtClean="0">
-                <a:latin typeface="Courier"/>
-                <a:cs typeface="Courier"/>
-              </a:rPr>
-              <a:t> </a:t>
-            </a:r>
-            <a:r>
-              <a:rPr lang="en-US" sz="1200" dirty="0" smtClean="0">
-                <a:latin typeface="Courier"/>
-                <a:cs typeface="Courier"/>
-              </a:rPr>
-              <a:t>=  children; </a:t>
-            </a:r>
-            <a:endParaRPr lang="en-US" sz="1200" dirty="0" smtClean="0">
-              <a:latin typeface="Courier"/>
-              <a:cs typeface="Courier"/>
-            </a:endParaRPr>
-          </a:p>
-          <a:p>
-            <a:pPr marL="0" indent="0">
-              <a:buNone/>
-            </a:pPr>
-            <a:r>
-              <a:rPr lang="en-US" sz="1200" dirty="0">
-                <a:latin typeface="Courier"/>
-                <a:cs typeface="Courier"/>
-              </a:rPr>
-              <a:t>	</a:t>
-            </a:r>
-            <a:r>
-              <a:rPr lang="en-US" sz="1200" dirty="0" smtClean="0">
-                <a:latin typeface="Courier"/>
-                <a:cs typeface="Courier"/>
-              </a:rPr>
               <a:t>}</a:t>
             </a:r>
-            <a:endParaRPr lang="en-US" sz="1200" dirty="0" smtClean="0">
-              <a:latin typeface="Courier"/>
-              <a:cs typeface="Courier"/>
-            </a:endParaRPr>
           </a:p>
           <a:p>
             <a:pPr marL="0" indent="0">
@@ -30112,14 +30268,7 @@
                 <a:latin typeface="Courier"/>
                 <a:cs typeface="Courier"/>
               </a:rPr>
-              <a:t>(</a:t>
-            </a:r>
-            <a:r>
-              <a:rPr lang="en-US" sz="1200" dirty="0" smtClean="0">
-                <a:latin typeface="Courier"/>
-                <a:cs typeface="Courier"/>
-              </a:rPr>
-              <a:t>alpha, beta);</a:t>
+              <a:t>(alpha, beta);</a:t>
             </a:r>
           </a:p>
           <a:p>

</xml_diff>